<commit_message>
Ajuste de mapa conceptual MA_07_13_C0
</commit_message>
<xml_diff>
--- a/fuentes/contenidos/grado07/guion13/Materiales_de_Autores/MapaConceptual_Tema_13.pptx
+++ b/fuentes/contenidos/grado07/guion13/Materiales_de_Autores/MapaConceptual_Tema_13.pptx
@@ -4,6 +4,9 @@
   <p:sldMasterIdLst>
     <p:sldMasterId id="2147483660" r:id="rId1"/>
   </p:sldMasterIdLst>
+  <p:handoutMasterIdLst>
+    <p:handoutMasterId r:id="rId3"/>
+  </p:handoutMasterIdLst>
   <p:sldIdLst>
     <p:sldId id="256" r:id="rId2"/>
   </p:sldIdLst>
@@ -106,10 +109,186 @@
   </p:defaultTextStyle>
   <p:extLst>
     <p:ext uri="{EFAFB233-063F-42B5-8137-9DF3F51BA10A}">
-      <p15:sldGuideLst xmlns:p15="http://schemas.microsoft.com/office/powerpoint/2012/main" xmlns=""/>
+      <p15:sldGuideLst xmlns:p15="http://schemas.microsoft.com/office/powerpoint/2012/main">
+        <p15:guide id="1" orient="horz" pos="2160">
+          <p15:clr>
+            <a:srgbClr val="A4A3A4"/>
+          </p15:clr>
+        </p15:guide>
+        <p15:guide id="2" pos="2880">
+          <p15:clr>
+            <a:srgbClr val="A4A3A4"/>
+          </p15:clr>
+        </p15:guide>
+      </p15:sldGuideLst>
     </p:ext>
   </p:extLst>
 </p:presentation>
+</file>
+
+<file path=ppt/handoutMasters/handoutMaster1.xml><?xml version="1.0" encoding="utf-8"?>
+<p:handoutMaster xmlns:a="http://schemas.openxmlformats.org/drawingml/2006/main" xmlns:r="http://schemas.openxmlformats.org/officeDocument/2006/relationships" xmlns:p="http://schemas.openxmlformats.org/presentationml/2006/main">
+  <p:cSld>
+    <p:bg>
+      <p:bgRef idx="1001">
+        <a:schemeClr val="bg1"/>
+      </p:bgRef>
+    </p:bg>
+    <p:spTree>
+      <p:nvGrpSpPr>
+        <p:cNvPr id="1" name=""/>
+        <p:cNvGrpSpPr/>
+        <p:nvPr/>
+      </p:nvGrpSpPr>
+      <p:grpSpPr>
+        <a:xfrm>
+          <a:off x="0" y="0"/>
+          <a:ext cx="0" cy="0"/>
+          <a:chOff x="0" y="0"/>
+          <a:chExt cx="0" cy="0"/>
+        </a:xfrm>
+      </p:grpSpPr>
+      <p:sp>
+        <p:nvSpPr>
+          <p:cNvPr id="2" name="Marcador de encabezado 1"/>
+          <p:cNvSpPr>
+            <a:spLocks noGrp="1"/>
+          </p:cNvSpPr>
+          <p:nvPr>
+            <p:ph type="hdr" sz="quarter"/>
+          </p:nvPr>
+        </p:nvSpPr>
+        <p:spPr>
+          <a:xfrm>
+            <a:off x="0" y="0"/>
+            <a:ext cx="2944813" cy="496888"/>
+          </a:xfrm>
+          <a:prstGeom prst="rect">
+            <a:avLst/>
+          </a:prstGeom>
+        </p:spPr>
+        <p:txBody>
+          <a:bodyPr vert="horz" lIns="91440" tIns="45720" rIns="91440" bIns="45720" rtlCol="0"/>
+          <a:lstStyle>
+            <a:lvl1pPr algn="l">
+              <a:defRPr sz="1200"/>
+            </a:lvl1pPr>
+          </a:lstStyle>
+          <a:p>
+            <a:endParaRPr lang="es-CO"/>
+          </a:p>
+        </p:txBody>
+      </p:sp>
+      <p:sp>
+        <p:nvSpPr>
+          <p:cNvPr id="3" name="Marcador de fecha 2"/>
+          <p:cNvSpPr>
+            <a:spLocks noGrp="1"/>
+          </p:cNvSpPr>
+          <p:nvPr>
+            <p:ph type="dt" sz="quarter" idx="1"/>
+          </p:nvPr>
+        </p:nvSpPr>
+        <p:spPr>
+          <a:xfrm>
+            <a:off x="3848100" y="0"/>
+            <a:ext cx="2944813" cy="496888"/>
+          </a:xfrm>
+          <a:prstGeom prst="rect">
+            <a:avLst/>
+          </a:prstGeom>
+        </p:spPr>
+        <p:txBody>
+          <a:bodyPr vert="horz" lIns="91440" tIns="45720" rIns="91440" bIns="45720" rtlCol="0"/>
+          <a:lstStyle>
+            <a:lvl1pPr algn="r">
+              <a:defRPr sz="1200"/>
+            </a:lvl1pPr>
+          </a:lstStyle>
+          <a:p>
+            <a:fld id="{91560A95-24CC-4106-A503-71CFDED071AE}" type="datetimeFigureOut">
+              <a:rPr lang="es-CO" smtClean="0"/>
+              <a:t>20/03/2016</a:t>
+            </a:fld>
+            <a:endParaRPr lang="es-CO"/>
+          </a:p>
+        </p:txBody>
+      </p:sp>
+      <p:sp>
+        <p:nvSpPr>
+          <p:cNvPr id="4" name="Marcador de pie de página 3"/>
+          <p:cNvSpPr>
+            <a:spLocks noGrp="1"/>
+          </p:cNvSpPr>
+          <p:nvPr>
+            <p:ph type="ftr" sz="quarter" idx="2"/>
+          </p:nvPr>
+        </p:nvSpPr>
+        <p:spPr>
+          <a:xfrm>
+            <a:off x="0" y="9421813"/>
+            <a:ext cx="2944813" cy="496887"/>
+          </a:xfrm>
+          <a:prstGeom prst="rect">
+            <a:avLst/>
+          </a:prstGeom>
+        </p:spPr>
+        <p:txBody>
+          <a:bodyPr vert="horz" lIns="91440" tIns="45720" rIns="91440" bIns="45720" rtlCol="0" anchor="b"/>
+          <a:lstStyle>
+            <a:lvl1pPr algn="l">
+              <a:defRPr sz="1200"/>
+            </a:lvl1pPr>
+          </a:lstStyle>
+          <a:p>
+            <a:endParaRPr lang="es-CO"/>
+          </a:p>
+        </p:txBody>
+      </p:sp>
+      <p:sp>
+        <p:nvSpPr>
+          <p:cNvPr id="5" name="Marcador de número de diapositiva 4"/>
+          <p:cNvSpPr>
+            <a:spLocks noGrp="1"/>
+          </p:cNvSpPr>
+          <p:nvPr>
+            <p:ph type="sldNum" sz="quarter" idx="3"/>
+          </p:nvPr>
+        </p:nvSpPr>
+        <p:spPr>
+          <a:xfrm>
+            <a:off x="3848100" y="9421813"/>
+            <a:ext cx="2944813" cy="496887"/>
+          </a:xfrm>
+          <a:prstGeom prst="rect">
+            <a:avLst/>
+          </a:prstGeom>
+        </p:spPr>
+        <p:txBody>
+          <a:bodyPr vert="horz" lIns="91440" tIns="45720" rIns="91440" bIns="45720" rtlCol="0" anchor="b"/>
+          <a:lstStyle>
+            <a:lvl1pPr algn="r">
+              <a:defRPr sz="1200"/>
+            </a:lvl1pPr>
+          </a:lstStyle>
+          <a:p>
+            <a:fld id="{85EB0301-9A2F-48C3-9A12-424E03C48B96}" type="slidenum">
+              <a:rPr lang="es-CO" smtClean="0"/>
+              <a:t>‹Nº›</a:t>
+            </a:fld>
+            <a:endParaRPr lang="es-CO"/>
+          </a:p>
+        </p:txBody>
+      </p:sp>
+    </p:spTree>
+    <p:extLst>
+      <p:ext uri="{BB962C8B-B14F-4D97-AF65-F5344CB8AC3E}">
+        <p14:creationId xmlns:p14="http://schemas.microsoft.com/office/powerpoint/2010/main" val="3519334523"/>
+      </p:ext>
+    </p:extLst>
+  </p:cSld>
+  <p:clrMap bg1="lt1" tx1="dk1" bg2="lt2" tx2="dk2" accent1="accent1" accent2="accent2" accent3="accent3" accent4="accent4" accent5="accent5" accent6="accent6" hlink="hlink" folHlink="folHlink"/>
+</p:handoutMaster>
 </file>
 
 <file path=ppt/slideLayouts/slideLayout1.xml><?xml version="1.0" encoding="utf-8"?>
@@ -450,7 +629,7 @@
           <a:p>
             <a:fld id="{5001C876-01F7-4317-94B9-1AE222133113}" type="datetimeFigureOut">
               <a:rPr lang="es-ES" smtClean="0"/>
-              <a:t>17/01/2016</a:t>
+              <a:t>20/03/2016</a:t>
             </a:fld>
             <a:endParaRPr lang="es-ES"/>
           </a:p>
@@ -654,7 +833,11 @@
           <a:p>
             <a:r>
               <a:rPr lang="es-ES" sz="1200" dirty="0" smtClean="0"/>
-              <a:t>© Editorial Planeta Colombiana S.A., 2015.</a:t>
+              <a:t>© Editorial Planeta Colombiana S.A., </a:t>
+            </a:r>
+            <a:r>
+              <a:rPr lang="es-ES" sz="1200" dirty="0" smtClean="0"/>
+              <a:t>2016.</a:t>
             </a:r>
             <a:endParaRPr lang="es-ES" sz="1200" dirty="0"/>
           </a:p>
@@ -1118,7 +1301,7 @@
                   <a:schemeClr val="bg1"/>
                 </a:solidFill>
               </a:rPr>
-              <a:t>Poliedros</a:t>
+              <a:t>poliedros</a:t>
             </a:r>
             <a:endParaRPr lang="es-ES" sz="1050" dirty="0">
               <a:solidFill>
@@ -1289,7 +1472,23 @@
                   <a:schemeClr val="tx1"/>
                 </a:solidFill>
               </a:rPr>
-              <a:t>Cuerpos  geométricos  limitados por figuras planas (polígonos).</a:t>
+              <a:t>cuerpos  </a:t>
+            </a:r>
+            <a:r>
+              <a:rPr lang="es-ES" sz="900" dirty="0" smtClean="0">
+                <a:solidFill>
+                  <a:schemeClr val="tx1"/>
+                </a:solidFill>
+              </a:rPr>
+              <a:t>geométricos  limitados por figuras planas (polígonos</a:t>
+            </a:r>
+            <a:r>
+              <a:rPr lang="es-ES" sz="900" dirty="0" smtClean="0">
+                <a:solidFill>
+                  <a:schemeClr val="tx1"/>
+                </a:solidFill>
+              </a:rPr>
+              <a:t>)</a:t>
             </a:r>
             <a:endParaRPr lang="es-ES" sz="900" dirty="0">
               <a:solidFill>
@@ -1347,7 +1546,15 @@
                   <a:schemeClr val="tx1"/>
                 </a:solidFill>
               </a:rPr>
-              <a:t>Relación de Euler</a:t>
+              <a:t>la relación </a:t>
+            </a:r>
+            <a:r>
+              <a:rPr lang="es-ES" sz="900" dirty="0" smtClean="0">
+                <a:solidFill>
+                  <a:schemeClr val="tx1"/>
+                </a:solidFill>
+              </a:rPr>
+              <a:t>de Euler</a:t>
             </a:r>
             <a:endParaRPr lang="es-ES" sz="900" dirty="0">
               <a:solidFill>
@@ -1563,7 +1770,9 @@
             <a:ext cx="105294" cy="6840"/>
           </a:xfrm>
           <a:prstGeom prst="bentConnector3">
-            <a:avLst/>
+            <a:avLst>
+              <a:gd name="adj1" fmla="val 247"/>
+            </a:avLst>
           </a:prstGeom>
           <a:ln w="12700">
             <a:solidFill>
@@ -1634,7 +1843,7 @@
                   <a:schemeClr val="tx1"/>
                 </a:solidFill>
               </a:rPr>
-              <a:t>La </a:t>
+              <a:t>la </a:t>
             </a:r>
             <a:r>
               <a:rPr lang="es-CO" sz="900" dirty="0">
@@ -1770,15 +1979,15 @@
                   <a:schemeClr val="tx1"/>
                 </a:solidFill>
               </a:rPr>
-              <a:t> aristas </a:t>
-            </a:r>
-            <a:r>
-              <a:rPr lang="es-CO" sz="900" dirty="0">
-                <a:solidFill>
-                  <a:schemeClr val="tx1"/>
-                </a:solidFill>
-              </a:rPr>
-              <a:t>.</a:t>
+              <a:t> </a:t>
+            </a:r>
+            <a:r>
+              <a:rPr lang="es-CO" sz="900" b="1" dirty="0" smtClean="0">
+                <a:solidFill>
+                  <a:schemeClr val="tx1"/>
+                </a:solidFill>
+              </a:rPr>
+              <a:t>aristas</a:t>
             </a:r>
             <a:endParaRPr lang="es-ES" sz="900" dirty="0">
               <a:solidFill>
@@ -1839,7 +2048,7 @@
           </a:xfrm>
           <a:prstGeom prst="bentConnector3">
             <a:avLst>
-              <a:gd name="adj1" fmla="val 50000"/>
+              <a:gd name="adj1" fmla="val 97424"/>
             </a:avLst>
           </a:prstGeom>
           <a:ln w="12700">
@@ -1994,7 +2203,11 @@
             <a:pPr algn="ctr"/>
             <a:r>
               <a:rPr lang="es-ES" sz="1200" b="1" dirty="0" smtClean="0"/>
-              <a:t>Figuras tridimensionales</a:t>
+              <a:t>Cuerpos </a:t>
+            </a:r>
+            <a:r>
+              <a:rPr lang="es-ES" sz="1200" b="1" dirty="0" smtClean="0"/>
+              <a:t>tridimensionales</a:t>
             </a:r>
             <a:endParaRPr lang="es-ES" sz="1200" b="1" dirty="0"/>
           </a:p>
@@ -2197,7 +2410,15 @@
                   <a:schemeClr val="tx1"/>
                 </a:solidFill>
               </a:rPr>
-              <a:t>Caras (polígonos)</a:t>
+              <a:t>caras </a:t>
+            </a:r>
+            <a:r>
+              <a:rPr lang="es-ES" sz="900" dirty="0" smtClean="0">
+                <a:solidFill>
+                  <a:schemeClr val="tx1"/>
+                </a:solidFill>
+              </a:rPr>
+              <a:t>(polígonos)</a:t>
             </a:r>
           </a:p>
           <a:p>
@@ -2211,7 +2432,15 @@
                   <a:schemeClr val="tx1"/>
                 </a:solidFill>
               </a:rPr>
-              <a:t>Aristas (segmentos)</a:t>
+              <a:t>aristas </a:t>
+            </a:r>
+            <a:r>
+              <a:rPr lang="es-ES" sz="900" dirty="0" smtClean="0">
+                <a:solidFill>
+                  <a:schemeClr val="tx1"/>
+                </a:solidFill>
+              </a:rPr>
+              <a:t>(segmentos)</a:t>
             </a:r>
           </a:p>
           <a:p>
@@ -2225,7 +2454,15 @@
                   <a:schemeClr val="tx1"/>
                 </a:solidFill>
               </a:rPr>
-              <a:t>Vértices (puntos)</a:t>
+              <a:t>vértices </a:t>
+            </a:r>
+            <a:r>
+              <a:rPr lang="es-ES" sz="900" dirty="0" smtClean="0">
+                <a:solidFill>
+                  <a:schemeClr val="tx1"/>
+                </a:solidFill>
+              </a:rPr>
+              <a:t>(puntos)</a:t>
             </a:r>
             <a:endParaRPr lang="es-ES" sz="900" dirty="0">
               <a:solidFill>
@@ -2243,8 +2480,8 @@
         </p:nvSpPr>
         <p:spPr>
           <a:xfrm>
-            <a:off x="2942480" y="3660286"/>
-            <a:ext cx="975077" cy="1253016"/>
+            <a:off x="2951686" y="3665263"/>
+            <a:ext cx="985630" cy="1253016"/>
           </a:xfrm>
           <a:prstGeom prst="rect">
             <a:avLst/>
@@ -2282,7 +2519,7 @@
                   <a:schemeClr val="tx1"/>
                 </a:solidFill>
               </a:rPr>
-              <a:t>Dos </a:t>
+              <a:t>dos </a:t>
             </a:r>
             <a:r>
               <a:rPr lang="es-CO" sz="900" dirty="0">
@@ -2290,7 +2527,7 @@
                   <a:schemeClr val="tx1"/>
                 </a:solidFill>
               </a:rPr>
-              <a:t>caras iguales </a:t>
+              <a:t>caras </a:t>
             </a:r>
             <a:r>
               <a:rPr lang="es-CO" sz="900" dirty="0" smtClean="0">
@@ -2298,7 +2535,15 @@
                   <a:schemeClr val="tx1"/>
                 </a:solidFill>
               </a:rPr>
-              <a:t> y </a:t>
+              <a:t>congruentes  </a:t>
+            </a:r>
+            <a:r>
+              <a:rPr lang="es-CO" sz="900" dirty="0" smtClean="0">
+                <a:solidFill>
+                  <a:schemeClr val="tx1"/>
+                </a:solidFill>
+              </a:rPr>
+              <a:t>y </a:t>
             </a:r>
             <a:r>
               <a:rPr lang="es-CO" sz="900" dirty="0">
@@ -2314,17 +2559,39 @@
                   <a:schemeClr val="tx1"/>
                 </a:solidFill>
               </a:rPr>
-              <a:t> entre sí (bases).</a:t>
-            </a:r>
-          </a:p>
-          <a:p>
+              <a:t> entre sí (</a:t>
+            </a:r>
+            <a:r>
+              <a:rPr lang="es-CO" sz="900" smtClean="0">
+                <a:solidFill>
+                  <a:schemeClr val="tx1"/>
+                </a:solidFill>
+              </a:rPr>
+              <a:t>bases</a:t>
+            </a:r>
+            <a:r>
+              <a:rPr lang="es-CO" sz="900" smtClean="0">
+                <a:solidFill>
+                  <a:schemeClr val="tx1"/>
+                </a:solidFill>
+              </a:rPr>
+              <a:t>). Las </a:t>
+            </a:r>
+            <a:r>
+              <a:rPr lang="es-CO" sz="900" dirty="0" smtClean="0">
+                <a:solidFill>
+                  <a:schemeClr val="tx1"/>
+                </a:solidFill>
+              </a:rPr>
+              <a:t>otras  caras </a:t>
+            </a:r>
             <a:r>
               <a:rPr lang="es-CO" sz="900" dirty="0">
                 <a:solidFill>
                   <a:schemeClr val="tx1"/>
                 </a:solidFill>
               </a:rPr>
-              <a:t>L</a:t>
+              <a:t>son </a:t>
             </a:r>
             <a:r>
               <a:rPr lang="es-CO" sz="900" dirty="0" smtClean="0">
@@ -2332,15 +2599,7 @@
                   <a:schemeClr val="tx1"/>
                 </a:solidFill>
               </a:rPr>
-              <a:t>as otras  caras </a:t>
-            </a:r>
-            <a:r>
-              <a:rPr lang="es-CO" sz="900" dirty="0">
-                <a:solidFill>
-                  <a:schemeClr val="tx1"/>
-                </a:solidFill>
-              </a:rPr>
-              <a:t>son </a:t>
+              <a:t>paralelogramos (caras  laterales</a:t>
             </a:r>
             <a:r>
               <a:rPr lang="es-CO" sz="900" dirty="0" smtClean="0">
@@ -2348,7 +2607,7 @@
                   <a:schemeClr val="tx1"/>
                 </a:solidFill>
               </a:rPr>
-              <a:t>paralelogramos (caras  laterales).</a:t>
+              <a:t>)</a:t>
             </a:r>
             <a:endParaRPr lang="es-ES" sz="900" dirty="0">
               <a:solidFill>
@@ -2489,21 +2748,7 @@
                   <a:schemeClr val="tx1"/>
                 </a:solidFill>
               </a:rPr>
-              <a:t>Hexaedro</a:t>
-            </a:r>
-          </a:p>
-          <a:p>
-            <a:pPr marL="171450" indent="-171450">
-              <a:buFont typeface="Arial" pitchFamily="34" charset="0"/>
-              <a:buChar char="•"/>
-            </a:pPr>
-            <a:r>
-              <a:rPr lang="es-ES" sz="900" dirty="0" smtClean="0">
-                <a:solidFill>
-                  <a:schemeClr val="tx1"/>
-                </a:solidFill>
-              </a:rPr>
-              <a:t>Tetraedro</a:t>
+              <a:t>hexaedro</a:t>
             </a:r>
             <a:endParaRPr lang="es-ES" sz="900" dirty="0" smtClean="0">
               <a:solidFill>
@@ -2522,8 +2767,13 @@
                   <a:schemeClr val="tx1"/>
                 </a:solidFill>
               </a:rPr>
-              <a:t>Octaedro</a:t>
-            </a:r>
+              <a:t>tetraedro</a:t>
+            </a:r>
+            <a:endParaRPr lang="es-ES" sz="900" dirty="0" smtClean="0">
+              <a:solidFill>
+                <a:schemeClr val="tx1"/>
+              </a:solidFill>
+            </a:endParaRPr>
           </a:p>
           <a:p>
             <a:pPr marL="171450" indent="-171450">
@@ -2536,8 +2786,13 @@
                   <a:schemeClr val="tx1"/>
                 </a:solidFill>
               </a:rPr>
-              <a:t>Icosaedro</a:t>
-            </a:r>
+              <a:t>octaedro</a:t>
+            </a:r>
+            <a:endParaRPr lang="es-ES" sz="900" dirty="0" smtClean="0">
+              <a:solidFill>
+                <a:schemeClr val="tx1"/>
+              </a:solidFill>
+            </a:endParaRPr>
           </a:p>
           <a:p>
             <a:pPr marL="171450" indent="-171450">
@@ -2550,7 +2805,26 @@
                   <a:schemeClr val="tx1"/>
                 </a:solidFill>
               </a:rPr>
-              <a:t>Dodecaedro</a:t>
+              <a:t>icosaedro</a:t>
+            </a:r>
+            <a:endParaRPr lang="es-ES" sz="900" dirty="0" smtClean="0">
+              <a:solidFill>
+                <a:schemeClr val="tx1"/>
+              </a:solidFill>
+            </a:endParaRPr>
+          </a:p>
+          <a:p>
+            <a:pPr marL="171450" indent="-171450">
+              <a:buFont typeface="Arial" pitchFamily="34" charset="0"/>
+              <a:buChar char="•"/>
+            </a:pPr>
+            <a:r>
+              <a:rPr lang="es-ES" sz="900" dirty="0" smtClean="0">
+                <a:solidFill>
+                  <a:schemeClr val="tx1"/>
+                </a:solidFill>
+              </a:rPr>
+              <a:t>dodecaedro</a:t>
             </a:r>
             <a:endParaRPr lang="es-ES" sz="900" dirty="0">
               <a:solidFill>
@@ -2601,9 +2875,9 @@
           <p:nvPr/>
         </p:nvCxnSpPr>
         <p:spPr>
-          <a:xfrm rot="5400000" flipH="1" flipV="1">
-            <a:off x="3335605" y="3551406"/>
-            <a:ext cx="203294" cy="14466"/>
+          <a:xfrm rot="16200000" flipV="1">
+            <a:off x="3340358" y="3561120"/>
+            <a:ext cx="208271" cy="16"/>
           </a:xfrm>
           <a:prstGeom prst="bentConnector3">
             <a:avLst>
@@ -2818,12 +3092,20 @@
           <a:p>
             <a:pPr algn="ctr"/>
             <a:r>
+              <a:rPr lang="es-ES" sz="900" dirty="0" smtClean="0">
+                <a:solidFill>
+                  <a:schemeClr val="tx1"/>
+                </a:solidFill>
+              </a:rPr>
+              <a:t>cuerpos  </a:t>
+            </a:r>
+            <a:r>
               <a:rPr lang="es-ES" sz="900" dirty="0">
                 <a:solidFill>
                   <a:schemeClr val="tx1"/>
                 </a:solidFill>
               </a:rPr>
-              <a:t>Cuerpos  geométricos </a:t>
+              <a:t>geométricos </a:t>
             </a:r>
             <a:r>
               <a:rPr lang="es-ES" sz="900" dirty="0" smtClean="0">
@@ -2855,7 +3137,15 @@
                   <a:schemeClr val="tx1"/>
                 </a:solidFill>
               </a:rPr>
-              <a:t>por una superficie curva.</a:t>
+              <a:t>por una superficie </a:t>
+            </a:r>
+            <a:r>
+              <a:rPr lang="es-CO" sz="900" dirty="0" smtClean="0">
+                <a:solidFill>
+                  <a:schemeClr val="tx1"/>
+                </a:solidFill>
+              </a:rPr>
+              <a:t>curva</a:t>
             </a:r>
             <a:endParaRPr lang="es-ES" sz="900" dirty="0">
               <a:solidFill>
@@ -2912,7 +3202,7 @@
                   <a:schemeClr val="tx1"/>
                 </a:solidFill>
               </a:rPr>
-              <a:t>Todas </a:t>
+              <a:t>todas </a:t>
             </a:r>
             <a:r>
               <a:rPr lang="es-CO" sz="900" dirty="0">
@@ -2954,7 +3244,23 @@
                   <a:schemeClr val="tx1"/>
                 </a:solidFill>
               </a:rPr>
-              <a:t>A cada vértices llega el </a:t>
+              <a:t>A cada </a:t>
+            </a:r>
+            <a:r>
+              <a:rPr lang="es-CO" sz="900" dirty="0" smtClean="0">
+                <a:solidFill>
+                  <a:schemeClr val="tx1"/>
+                </a:solidFill>
+              </a:rPr>
+              <a:t>vértice </a:t>
+            </a:r>
+            <a:r>
+              <a:rPr lang="es-CO" sz="900" dirty="0" smtClean="0">
+                <a:solidFill>
+                  <a:schemeClr val="tx1"/>
+                </a:solidFill>
+              </a:rPr>
+              <a:t>llega el </a:t>
             </a:r>
             <a:r>
               <a:rPr lang="es-CO" sz="900" dirty="0">
@@ -2970,7 +3276,7 @@
                   <a:schemeClr val="tx1"/>
                 </a:solidFill>
               </a:rPr>
-              <a:t>aristas.</a:t>
+              <a:t>aristas</a:t>
             </a:r>
             <a:endParaRPr lang="es-ES" sz="900" dirty="0">
               <a:solidFill>
@@ -2988,7 +3294,7 @@
         </p:nvSpPr>
         <p:spPr>
           <a:xfrm>
-            <a:off x="3965937" y="3650330"/>
+            <a:off x="3970922" y="3666370"/>
             <a:ext cx="874811" cy="1262972"/>
           </a:xfrm>
           <a:prstGeom prst="rect">
@@ -3027,7 +3333,15 @@
                   <a:schemeClr val="tx1"/>
                 </a:solidFill>
               </a:rPr>
-              <a:t>Una cara poligonal </a:t>
+              <a:t>una </a:t>
+            </a:r>
+            <a:r>
+              <a:rPr lang="es-CO" sz="900" dirty="0" smtClean="0">
+                <a:solidFill>
+                  <a:schemeClr val="tx1"/>
+                </a:solidFill>
+              </a:rPr>
+              <a:t>cara poligonal </a:t>
             </a:r>
             <a:r>
               <a:rPr lang="es-CO" sz="900" dirty="0">
@@ -3069,7 +3383,7 @@
                   <a:schemeClr val="tx1"/>
                 </a:solidFill>
               </a:rPr>
-              <a:t>vértice.</a:t>
+              <a:t>vértice</a:t>
             </a:r>
             <a:endParaRPr lang="es-ES" sz="900" dirty="0">
               <a:solidFill>
@@ -3170,7 +3484,7 @@
           </a:xfrm>
           <a:prstGeom prst="bentConnector3">
             <a:avLst>
-              <a:gd name="adj1" fmla="val 50000"/>
+              <a:gd name="adj1" fmla="val 1373"/>
             </a:avLst>
           </a:prstGeom>
           <a:ln w="12700">
@@ -3210,7 +3524,7 @@
           </a:xfrm>
           <a:prstGeom prst="bentConnector3">
             <a:avLst>
-              <a:gd name="adj1" fmla="val 50000"/>
+              <a:gd name="adj1" fmla="val 99376"/>
             </a:avLst>
           </a:prstGeom>
           <a:ln w="12700">
@@ -3268,20 +3582,17 @@
       <p:cxnSp>
         <p:nvCxnSpPr>
           <p:cNvPr id="292" name="Conector angular 291"/>
-          <p:cNvCxnSpPr>
-            <a:stCxn id="209" idx="2"/>
-            <a:endCxn id="291" idx="0"/>
-          </p:cNvCxnSpPr>
+          <p:cNvCxnSpPr/>
           <p:nvPr/>
         </p:nvCxnSpPr>
         <p:spPr>
           <a:xfrm rot="16200000" flipH="1">
-            <a:off x="4338227" y="3155303"/>
-            <a:ext cx="128480" cy="13233"/>
+            <a:off x="4291881" y="3139672"/>
+            <a:ext cx="125541" cy="36299"/>
           </a:xfrm>
           <a:prstGeom prst="bentConnector3">
             <a:avLst>
-              <a:gd name="adj1" fmla="val 50000"/>
+              <a:gd name="adj1" fmla="val -1592"/>
             </a:avLst>
           </a:prstGeom>
           <a:ln w="12700">
@@ -3308,19 +3619,18 @@
       <p:cxnSp>
         <p:nvCxnSpPr>
           <p:cNvPr id="293" name="Conector angular 292"/>
-          <p:cNvCxnSpPr>
-            <a:stCxn id="286" idx="0"/>
-            <a:endCxn id="291" idx="2"/>
-          </p:cNvCxnSpPr>
+          <p:cNvCxnSpPr/>
           <p:nvPr/>
         </p:nvCxnSpPr>
         <p:spPr>
           <a:xfrm rot="5400000" flipH="1" flipV="1">
-            <a:off x="4309544" y="3550791"/>
+            <a:off x="4274891" y="3550790"/>
             <a:ext cx="193338" cy="5741"/>
           </a:xfrm>
           <a:prstGeom prst="bentConnector3">
-            <a:avLst/>
+            <a:avLst>
+              <a:gd name="adj1" fmla="val -5180"/>
+            </a:avLst>
           </a:prstGeom>
           <a:ln w="12700">
             <a:solidFill>
@@ -3386,7 +3696,7 @@
         </p:nvSpPr>
         <p:spPr>
           <a:xfrm>
-            <a:off x="6405658" y="1857407"/>
+            <a:off x="6405658" y="1856727"/>
             <a:ext cx="1124746" cy="357473"/>
           </a:xfrm>
           <a:prstGeom prst="rect">
@@ -3428,7 +3738,15 @@
                   <a:schemeClr val="bg1"/>
                 </a:solidFill>
               </a:rPr>
-              <a:t>Cuerpos redondos</a:t>
+              <a:t>cuerpos </a:t>
+            </a:r>
+            <a:r>
+              <a:rPr lang="es-ES" sz="1050" dirty="0" smtClean="0">
+                <a:solidFill>
+                  <a:schemeClr val="bg1"/>
+                </a:solidFill>
+              </a:rPr>
+              <a:t>redondos</a:t>
             </a:r>
             <a:endParaRPr lang="es-ES" sz="1050" dirty="0">
               <a:solidFill>
@@ -3441,15 +3759,12 @@
       <p:cxnSp>
         <p:nvCxnSpPr>
           <p:cNvPr id="340" name="Conector angular 339"/>
-          <p:cNvCxnSpPr>
-            <a:stCxn id="218" idx="2"/>
-            <a:endCxn id="339" idx="0"/>
-          </p:cNvCxnSpPr>
+          <p:cNvCxnSpPr/>
           <p:nvPr/>
         </p:nvCxnSpPr>
         <p:spPr>
           <a:xfrm rot="16200000" flipH="1">
-            <a:off x="5791868" y="681244"/>
+            <a:off x="5791868" y="688381"/>
             <a:ext cx="135888" cy="2216437"/>
           </a:xfrm>
           <a:prstGeom prst="bentConnector3">
@@ -3494,7 +3809,7 @@
           </a:xfrm>
           <a:prstGeom prst="bentConnector3">
             <a:avLst>
-              <a:gd name="adj1" fmla="val 50000"/>
+              <a:gd name="adj1" fmla="val 98937"/>
             </a:avLst>
           </a:prstGeom>
           <a:ln w="12700">
@@ -3526,8 +3841,8 @@
         </p:nvSpPr>
         <p:spPr>
           <a:xfrm>
-            <a:off x="8008168" y="3991364"/>
-            <a:ext cx="895342" cy="353519"/>
+            <a:off x="8291088" y="4154757"/>
+            <a:ext cx="480842" cy="199332"/>
           </a:xfrm>
           <a:prstGeom prst="rect">
             <a:avLst/>
@@ -3566,7 +3881,7 @@
                   <a:schemeClr val="tx1"/>
                 </a:solidFill>
               </a:rPr>
-              <a:t>Esfera</a:t>
+              <a:t>esfera</a:t>
             </a:r>
             <a:endParaRPr lang="es-ES" sz="900" dirty="0">
               <a:solidFill>
@@ -3695,8 +4010,8 @@
         </p:nvSpPr>
         <p:spPr>
           <a:xfrm>
-            <a:off x="7422633" y="4480050"/>
-            <a:ext cx="902217" cy="353519"/>
+            <a:off x="7620820" y="4154945"/>
+            <a:ext cx="504886" cy="180348"/>
           </a:xfrm>
           <a:prstGeom prst="rect">
             <a:avLst/>
@@ -3735,7 +4050,7 @@
                   <a:schemeClr val="tx1"/>
                 </a:solidFill>
               </a:rPr>
-              <a:t>Cono</a:t>
+              <a:t>cono</a:t>
             </a:r>
             <a:endParaRPr lang="es-ES" sz="900" dirty="0">
               <a:solidFill>
@@ -3749,20 +4064,17 @@
         <p:nvCxnSpPr>
           <p:cNvPr id="357" name="Conector angular 356"/>
           <p:cNvCxnSpPr>
-            <a:stCxn id="346" idx="2"/>
             <a:endCxn id="345" idx="0"/>
           </p:cNvCxnSpPr>
           <p:nvPr/>
         </p:nvCxnSpPr>
         <p:spPr>
-          <a:xfrm rot="16200000" flipH="1">
-            <a:off x="8122287" y="3657812"/>
-            <a:ext cx="88498" cy="578606"/>
-          </a:xfrm>
-          <a:prstGeom prst="bentConnector3">
-            <a:avLst>
-              <a:gd name="adj1" fmla="val 50000"/>
-            </a:avLst>
+          <a:xfrm>
+            <a:off x="7873262" y="3896100"/>
+            <a:ext cx="658247" cy="258657"/>
+          </a:xfrm>
+          <a:prstGeom prst="bentConnector2">
+            <a:avLst/>
           </a:prstGeom>
           <a:ln w="12700">
             <a:solidFill>
@@ -3789,19 +4101,18 @@
         <p:nvCxnSpPr>
           <p:cNvPr id="358" name="Conector angular 357"/>
           <p:cNvCxnSpPr>
-            <a:stCxn id="353" idx="0"/>
             <a:endCxn id="346" idx="2"/>
           </p:cNvCxnSpPr>
           <p:nvPr/>
         </p:nvCxnSpPr>
         <p:spPr>
           <a:xfrm rot="5400000" flipH="1" flipV="1">
-            <a:off x="7586895" y="4189713"/>
-            <a:ext cx="577184" cy="3491"/>
+            <a:off x="7751597" y="4024532"/>
+            <a:ext cx="247302" cy="3970"/>
           </a:xfrm>
           <a:prstGeom prst="bentConnector3">
             <a:avLst>
-              <a:gd name="adj1" fmla="val 50000"/>
+              <a:gd name="adj1" fmla="val -3922"/>
             </a:avLst>
           </a:prstGeom>
           <a:ln w="12700">
@@ -3830,19 +4141,16 @@
           <p:cNvPr id="359" name="Conector angular 358"/>
           <p:cNvCxnSpPr>
             <a:stCxn id="364" idx="0"/>
-            <a:endCxn id="346" idx="2"/>
           </p:cNvCxnSpPr>
           <p:nvPr/>
         </p:nvCxnSpPr>
         <p:spPr>
           <a:xfrm rot="5400000" flipH="1" flipV="1">
-            <a:off x="7520522" y="3650402"/>
-            <a:ext cx="104247" cy="609176"/>
-          </a:xfrm>
-          <a:prstGeom prst="bentConnector3">
-            <a:avLst>
-              <a:gd name="adj1" fmla="val 50000"/>
-            </a:avLst>
+            <a:off x="7392220" y="3674217"/>
+            <a:ext cx="256107" cy="705980"/>
+          </a:xfrm>
+          <a:prstGeom prst="bentConnector2">
+            <a:avLst/>
           </a:prstGeom>
           <a:ln w="12700">
             <a:solidFill>
@@ -3873,8 +4181,8 @@
         </p:nvSpPr>
         <p:spPr>
           <a:xfrm>
-            <a:off x="6826767" y="4007113"/>
-            <a:ext cx="882580" cy="353519"/>
+            <a:off x="6868054" y="4155260"/>
+            <a:ext cx="598458" cy="180033"/>
           </a:xfrm>
           <a:prstGeom prst="rect">
             <a:avLst/>
@@ -3913,7 +4221,7 @@
                   <a:schemeClr val="tx1"/>
                 </a:solidFill>
               </a:rPr>
-              <a:t>Cilindro</a:t>
+              <a:t>cilindro</a:t>
             </a:r>
             <a:endParaRPr lang="es-ES" sz="900" dirty="0">
               <a:solidFill>
@@ -3966,12 +4274,28 @@
           <a:p>
             <a:pPr algn="ctr"/>
             <a:r>
+              <a:rPr lang="es-ES" sz="900" dirty="0">
+                <a:solidFill>
+                  <a:schemeClr val="tx1"/>
+                </a:solidFill>
+              </a:rPr>
+              <a:t>g</a:t>
+            </a:r>
+            <a:r>
               <a:rPr lang="es-ES" sz="900" dirty="0" smtClean="0">
                 <a:solidFill>
                   <a:schemeClr val="tx1"/>
                 </a:solidFill>
               </a:rPr>
-              <a:t>Giro de una figura plana alrededor de un eje.</a:t>
+              <a:t>iro </a:t>
+            </a:r>
+            <a:r>
+              <a:rPr lang="es-ES" sz="900" dirty="0" smtClean="0">
+                <a:solidFill>
+                  <a:schemeClr val="tx1"/>
+                </a:solidFill>
+              </a:rPr>
+              <a:t>de una figura plana alrededor de un eje.</a:t>
             </a:r>
             <a:endParaRPr lang="es-ES" sz="900" dirty="0">
               <a:solidFill>
@@ -4032,12 +4356,12 @@
         </p:nvCxnSpPr>
         <p:spPr>
           <a:xfrm rot="5400000">
-            <a:off x="6887493" y="2291632"/>
-            <a:ext cx="157291" cy="3786"/>
+            <a:off x="6887153" y="2291292"/>
+            <a:ext cx="157971" cy="3786"/>
           </a:xfrm>
           <a:prstGeom prst="bentConnector3">
             <a:avLst>
-              <a:gd name="adj1" fmla="val 50000"/>
+              <a:gd name="adj1" fmla="val -1253"/>
             </a:avLst>
           </a:prstGeom>
           <a:ln w="12700">
@@ -4142,7 +4466,7 @@
                   <a:schemeClr val="tx1"/>
                 </a:solidFill>
               </a:rPr>
-              <a:t>Prismas</a:t>
+              <a:t>prismas</a:t>
             </a:r>
             <a:endParaRPr lang="es-ES" sz="900" dirty="0">
               <a:solidFill>
@@ -4160,7 +4484,7 @@
         </p:nvSpPr>
         <p:spPr>
           <a:xfrm>
-            <a:off x="3993100" y="2754239"/>
+            <a:off x="3970034" y="2757178"/>
             <a:ext cx="805502" cy="343441"/>
           </a:xfrm>
           <a:prstGeom prst="rect">
@@ -4202,7 +4526,7 @@
                   <a:schemeClr val="tx1"/>
                 </a:solidFill>
               </a:rPr>
-              <a:t>Pirámides</a:t>
+              <a:t>pirámides</a:t>
             </a:r>
             <a:endParaRPr lang="es-ES" sz="900" dirty="0">
               <a:solidFill>
@@ -4262,7 +4586,15 @@
                   <a:schemeClr val="tx1"/>
                 </a:solidFill>
               </a:rPr>
-              <a:t>Poliedros regulares</a:t>
+              <a:t>poliedros </a:t>
+            </a:r>
+            <a:r>
+              <a:rPr lang="es-ES" sz="900" dirty="0" smtClean="0">
+                <a:solidFill>
+                  <a:schemeClr val="tx1"/>
+                </a:solidFill>
+              </a:rPr>
+              <a:t>regulares</a:t>
             </a:r>
             <a:endParaRPr lang="es-ES" sz="900" dirty="0">
               <a:solidFill>
@@ -4283,8 +4615,8 @@
         </p:nvCxnSpPr>
         <p:spPr>
           <a:xfrm rot="16200000" flipH="1">
-            <a:off x="4306655" y="2665043"/>
-            <a:ext cx="151230" cy="27162"/>
+            <a:off x="4293653" y="2678045"/>
+            <a:ext cx="154169" cy="4096"/>
           </a:xfrm>
           <a:prstGeom prst="bentConnector3">
             <a:avLst>
@@ -4658,7 +4990,268 @@
   <a:extraClrSchemeLst/>
   <a:extLst>
     <a:ext uri="{05A4C25C-085E-4340-85A3-A5531E510DB2}">
-      <thm15:themeFamily xmlns:thm15="http://schemas.microsoft.com/office/thememl/2012/main" xmlns="" name="Office Theme" id="{62F939B6-93AF-4DB8-9C6B-D6C7DFDC589F}" vid="{4A3C46E8-61CC-4603-A589-7422A47A8E4A}"/>
+      <thm15:themeFamily xmlns:thm15="http://schemas.microsoft.com/office/thememl/2012/main" name="Office Theme" id="{62F939B6-93AF-4DB8-9C6B-D6C7DFDC589F}" vid="{4A3C46E8-61CC-4603-A589-7422A47A8E4A}"/>
+    </a:ext>
+  </a:extLst>
+</a:theme>
+</file>
+
+<file path=ppt/theme/theme2.xml><?xml version="1.0" encoding="utf-8"?>
+<a:theme xmlns:a="http://schemas.openxmlformats.org/drawingml/2006/main" name="Tema de Office">
+  <a:themeElements>
+    <a:clrScheme name="Office">
+      <a:dk1>
+        <a:sysClr val="windowText" lastClr="000000"/>
+      </a:dk1>
+      <a:lt1>
+        <a:sysClr val="window" lastClr="FFFFFF"/>
+      </a:lt1>
+      <a:dk2>
+        <a:srgbClr val="44546A"/>
+      </a:dk2>
+      <a:lt2>
+        <a:srgbClr val="E7E6E6"/>
+      </a:lt2>
+      <a:accent1>
+        <a:srgbClr val="5B9BD5"/>
+      </a:accent1>
+      <a:accent2>
+        <a:srgbClr val="ED7D31"/>
+      </a:accent2>
+      <a:accent3>
+        <a:srgbClr val="A5A5A5"/>
+      </a:accent3>
+      <a:accent4>
+        <a:srgbClr val="FFC000"/>
+      </a:accent4>
+      <a:accent5>
+        <a:srgbClr val="4472C4"/>
+      </a:accent5>
+      <a:accent6>
+        <a:srgbClr val="70AD47"/>
+      </a:accent6>
+      <a:hlink>
+        <a:srgbClr val="0563C1"/>
+      </a:hlink>
+      <a:folHlink>
+        <a:srgbClr val="954F72"/>
+      </a:folHlink>
+    </a:clrScheme>
+    <a:fontScheme name="Office">
+      <a:majorFont>
+        <a:latin typeface="Calibri Light" panose="020F0302020204030204"/>
+        <a:ea typeface=""/>
+        <a:cs typeface=""/>
+        <a:font script="Jpan" typeface="ＭＳ Ｐゴシック"/>
+        <a:font script="Hang" typeface="맑은 고딕"/>
+        <a:font script="Hans" typeface="宋体"/>
+        <a:font script="Hant" typeface="新細明體"/>
+        <a:font script="Arab" typeface="Times New Roman"/>
+        <a:font script="Hebr" typeface="Times New Roman"/>
+        <a:font script="Thai" typeface="Angsana New"/>
+        <a:font script="Ethi" typeface="Nyala"/>
+        <a:font script="Beng" typeface="Vrinda"/>
+        <a:font script="Gujr" typeface="Shruti"/>
+        <a:font script="Khmr" typeface="MoolBoran"/>
+        <a:font script="Knda" typeface="Tunga"/>
+        <a:font script="Guru" typeface="Raavi"/>
+        <a:font script="Cans" typeface="Euphemia"/>
+        <a:font script="Cher" typeface="Plantagenet Cherokee"/>
+        <a:font script="Yiii" typeface="Microsoft Yi Baiti"/>
+        <a:font script="Tibt" typeface="Microsoft Himalaya"/>
+        <a:font script="Thaa" typeface="MV Boli"/>
+        <a:font script="Deva" typeface="Mangal"/>
+        <a:font script="Telu" typeface="Gautami"/>
+        <a:font script="Taml" typeface="Latha"/>
+        <a:font script="Syrc" typeface="Estrangelo Edessa"/>
+        <a:font script="Orya" typeface="Kalinga"/>
+        <a:font script="Mlym" typeface="Kartika"/>
+        <a:font script="Laoo" typeface="DokChampa"/>
+        <a:font script="Sinh" typeface="Iskoola Pota"/>
+        <a:font script="Mong" typeface="Mongolian Baiti"/>
+        <a:font script="Viet" typeface="Times New Roman"/>
+        <a:font script="Uigh" typeface="Microsoft Uighur"/>
+        <a:font script="Geor" typeface="Sylfaen"/>
+      </a:majorFont>
+      <a:minorFont>
+        <a:latin typeface="Calibri" panose="020F0502020204030204"/>
+        <a:ea typeface=""/>
+        <a:cs typeface=""/>
+        <a:font script="Jpan" typeface="ＭＳ Ｐゴシック"/>
+        <a:font script="Hang" typeface="맑은 고딕"/>
+        <a:font script="Hans" typeface="宋体"/>
+        <a:font script="Hant" typeface="新細明體"/>
+        <a:font script="Arab" typeface="Arial"/>
+        <a:font script="Hebr" typeface="Arial"/>
+        <a:font script="Thai" typeface="Cordia New"/>
+        <a:font script="Ethi" typeface="Nyala"/>
+        <a:font script="Beng" typeface="Vrinda"/>
+        <a:font script="Gujr" typeface="Shruti"/>
+        <a:font script="Khmr" typeface="DaunPenh"/>
+        <a:font script="Knda" typeface="Tunga"/>
+        <a:font script="Guru" typeface="Raavi"/>
+        <a:font script="Cans" typeface="Euphemia"/>
+        <a:font script="Cher" typeface="Plantagenet Cherokee"/>
+        <a:font script="Yiii" typeface="Microsoft Yi Baiti"/>
+        <a:font script="Tibt" typeface="Microsoft Himalaya"/>
+        <a:font script="Thaa" typeface="MV Boli"/>
+        <a:font script="Deva" typeface="Mangal"/>
+        <a:font script="Telu" typeface="Gautami"/>
+        <a:font script="Taml" typeface="Latha"/>
+        <a:font script="Syrc" typeface="Estrangelo Edessa"/>
+        <a:font script="Orya" typeface="Kalinga"/>
+        <a:font script="Mlym" typeface="Kartika"/>
+        <a:font script="Laoo" typeface="DokChampa"/>
+        <a:font script="Sinh" typeface="Iskoola Pota"/>
+        <a:font script="Mong" typeface="Mongolian Baiti"/>
+        <a:font script="Viet" typeface="Arial"/>
+        <a:font script="Uigh" typeface="Microsoft Uighur"/>
+        <a:font script="Geor" typeface="Sylfaen"/>
+      </a:minorFont>
+    </a:fontScheme>
+    <a:fmtScheme name="Office">
+      <a:fillStyleLst>
+        <a:solidFill>
+          <a:schemeClr val="phClr"/>
+        </a:solidFill>
+        <a:gradFill rotWithShape="1">
+          <a:gsLst>
+            <a:gs pos="0">
+              <a:schemeClr val="phClr">
+                <a:lumMod val="110000"/>
+                <a:satMod val="105000"/>
+                <a:tint val="67000"/>
+              </a:schemeClr>
+            </a:gs>
+            <a:gs pos="50000">
+              <a:schemeClr val="phClr">
+                <a:lumMod val="105000"/>
+                <a:satMod val="103000"/>
+                <a:tint val="73000"/>
+              </a:schemeClr>
+            </a:gs>
+            <a:gs pos="100000">
+              <a:schemeClr val="phClr">
+                <a:lumMod val="105000"/>
+                <a:satMod val="109000"/>
+                <a:tint val="81000"/>
+              </a:schemeClr>
+            </a:gs>
+          </a:gsLst>
+          <a:lin ang="5400000" scaled="0"/>
+        </a:gradFill>
+        <a:gradFill rotWithShape="1">
+          <a:gsLst>
+            <a:gs pos="0">
+              <a:schemeClr val="phClr">
+                <a:satMod val="103000"/>
+                <a:lumMod val="102000"/>
+                <a:tint val="94000"/>
+              </a:schemeClr>
+            </a:gs>
+            <a:gs pos="50000">
+              <a:schemeClr val="phClr">
+                <a:satMod val="110000"/>
+                <a:lumMod val="100000"/>
+                <a:shade val="100000"/>
+              </a:schemeClr>
+            </a:gs>
+            <a:gs pos="100000">
+              <a:schemeClr val="phClr">
+                <a:lumMod val="99000"/>
+                <a:satMod val="120000"/>
+                <a:shade val="78000"/>
+              </a:schemeClr>
+            </a:gs>
+          </a:gsLst>
+          <a:lin ang="5400000" scaled="0"/>
+        </a:gradFill>
+      </a:fillStyleLst>
+      <a:lnStyleLst>
+        <a:ln w="6350" cap="flat" cmpd="sng" algn="ctr">
+          <a:solidFill>
+            <a:schemeClr val="phClr"/>
+          </a:solidFill>
+          <a:prstDash val="solid"/>
+          <a:miter lim="800000"/>
+        </a:ln>
+        <a:ln w="12700" cap="flat" cmpd="sng" algn="ctr">
+          <a:solidFill>
+            <a:schemeClr val="phClr"/>
+          </a:solidFill>
+          <a:prstDash val="solid"/>
+          <a:miter lim="800000"/>
+        </a:ln>
+        <a:ln w="19050" cap="flat" cmpd="sng" algn="ctr">
+          <a:solidFill>
+            <a:schemeClr val="phClr"/>
+          </a:solidFill>
+          <a:prstDash val="solid"/>
+          <a:miter lim="800000"/>
+        </a:ln>
+      </a:lnStyleLst>
+      <a:effectStyleLst>
+        <a:effectStyle>
+          <a:effectLst/>
+        </a:effectStyle>
+        <a:effectStyle>
+          <a:effectLst/>
+        </a:effectStyle>
+        <a:effectStyle>
+          <a:effectLst>
+            <a:outerShdw blurRad="57150" dist="19050" dir="5400000" algn="ctr" rotWithShape="0">
+              <a:srgbClr val="000000">
+                <a:alpha val="63000"/>
+              </a:srgbClr>
+            </a:outerShdw>
+          </a:effectLst>
+        </a:effectStyle>
+      </a:effectStyleLst>
+      <a:bgFillStyleLst>
+        <a:solidFill>
+          <a:schemeClr val="phClr"/>
+        </a:solidFill>
+        <a:solidFill>
+          <a:schemeClr val="phClr">
+            <a:tint val="95000"/>
+            <a:satMod val="170000"/>
+          </a:schemeClr>
+        </a:solidFill>
+        <a:gradFill rotWithShape="1">
+          <a:gsLst>
+            <a:gs pos="0">
+              <a:schemeClr val="phClr">
+                <a:tint val="93000"/>
+                <a:satMod val="150000"/>
+                <a:shade val="98000"/>
+                <a:lumMod val="102000"/>
+              </a:schemeClr>
+            </a:gs>
+            <a:gs pos="50000">
+              <a:schemeClr val="phClr">
+                <a:tint val="98000"/>
+                <a:satMod val="130000"/>
+                <a:shade val="90000"/>
+                <a:lumMod val="103000"/>
+              </a:schemeClr>
+            </a:gs>
+            <a:gs pos="100000">
+              <a:schemeClr val="phClr">
+                <a:shade val="63000"/>
+                <a:satMod val="120000"/>
+              </a:schemeClr>
+            </a:gs>
+          </a:gsLst>
+          <a:lin ang="5400000" scaled="0"/>
+        </a:gradFill>
+      </a:bgFillStyleLst>
+    </a:fmtScheme>
+  </a:themeElements>
+  <a:objectDefaults/>
+  <a:extraClrSchemeLst/>
+  <a:extLst>
+    <a:ext uri="{05A4C25C-085E-4340-85A3-A5531E510DB2}">
+      <thm15:themeFamily xmlns:thm15="http://schemas.microsoft.com/office/thememl/2012/main" name="Office Theme" id="{62F939B6-93AF-4DB8-9C6B-D6C7DFDC589F}" vid="{4A3C46E8-61CC-4603-A589-7422A47A8E4A}"/>
     </a:ext>
   </a:extLst>
 </a:theme>

</xml_diff>